<commit_message>
added write-up and fixed ppt
</commit_message>
<xml_diff>
--- a/BestSellerBooks.pptx
+++ b/BestSellerBooks.pptx
@@ -12350,7 +12350,7 @@
                 <a:cs typeface="Oswald"/>
                 <a:sym typeface="Oswald"/>
               </a:rPr>
-              <a:t>General Fiction</a:t>
+              <a:t>General Fiction (~35%)</a:t>
             </a:r>
             <a:endParaRPr sz="1400" b="1">
               <a:latin typeface="Oswald"/>
@@ -12390,7 +12390,7 @@
                 <a:cs typeface="Oswald"/>
                 <a:sym typeface="Oswald"/>
               </a:rPr>
-              <a:t>- Penguin/Transworld Group</a:t>
+              <a:t>- Penguin/Transworld Group (~54%)</a:t>
             </a:r>
             <a:endParaRPr sz="1400" b="1">
               <a:latin typeface="Oswald"/>
@@ -12501,7 +12501,7 @@
                 <a:cs typeface="Oswald Regular"/>
                 <a:sym typeface="Oswald Regular"/>
               </a:rPr>
-              <a:t>Publish Date - </a:t>
+              <a:t>Publish Season - </a:t>
             </a:r>
             <a:r>
               <a:rPr lang="en" sz="1400" b="1">

</xml_diff>